<commit_message>
Fix various cosmetic and spelling issues.
</commit_message>
<xml_diff>
--- a/lecture-1/presentation-1.pptx
+++ b/lecture-1/presentation-1.pptx
@@ -204,7 +204,7 @@
           <a:p>
             <a:fld id="{E758746B-B0EA-CA41-BB8E-A8C6FE44757D}" type="datetimeFigureOut">
               <a:rPr lang="en-US"/>
-              <a:t>10/7/19</a:t>
+              <a:t>11/6/19</a:t>
             </a:fld>
             <a:endParaRPr lang="en-US" dirty="0"/>
           </a:p>
@@ -619,7 +619,7 @@
             <a:fld id="{B61BEF0D-F0BB-DE4B-95CE-6DB70DBA9567}" type="datetimeFigureOut">
               <a:rPr lang="en-US"/>
               <a:pPr/>
-              <a:t>10/7/19</a:t>
+              <a:t>11/6/19</a:t>
             </a:fld>
             <a:endParaRPr lang="en-US" dirty="0"/>
           </a:p>
@@ -831,7 +831,7 @@
             <a:fld id="{B61BEF0D-F0BB-DE4B-95CE-6DB70DBA9567}" type="datetimeFigureOut">
               <a:rPr lang="en-US"/>
               <a:pPr/>
-              <a:t>10/7/19</a:t>
+              <a:t>11/6/19</a:t>
             </a:fld>
             <a:endParaRPr lang="en-US" dirty="0"/>
           </a:p>
@@ -1053,7 +1053,7 @@
             <a:fld id="{B61BEF0D-F0BB-DE4B-95CE-6DB70DBA9567}" type="datetimeFigureOut">
               <a:rPr lang="en-US"/>
               <a:pPr/>
-              <a:t>10/7/19</a:t>
+              <a:t>11/6/19</a:t>
             </a:fld>
             <a:endParaRPr lang="en-US" dirty="0"/>
           </a:p>
@@ -1265,7 +1265,7 @@
             <a:fld id="{B61BEF0D-F0BB-DE4B-95CE-6DB70DBA9567}" type="datetimeFigureOut">
               <a:rPr lang="en-US"/>
               <a:pPr/>
-              <a:t>10/7/19</a:t>
+              <a:t>11/6/19</a:t>
             </a:fld>
             <a:endParaRPr lang="en-US" dirty="0"/>
           </a:p>
@@ -1554,7 +1554,7 @@
             <a:fld id="{B61BEF0D-F0BB-DE4B-95CE-6DB70DBA9567}" type="datetimeFigureOut">
               <a:rPr lang="en-US"/>
               <a:pPr/>
-              <a:t>10/7/19</a:t>
+              <a:t>11/6/19</a:t>
             </a:fld>
             <a:endParaRPr lang="en-US" dirty="0"/>
           </a:p>
@@ -1833,7 +1833,7 @@
             <a:fld id="{B61BEF0D-F0BB-DE4B-95CE-6DB70DBA9567}" type="datetimeFigureOut">
               <a:rPr lang="en-US"/>
               <a:pPr/>
-              <a:t>10/7/19</a:t>
+              <a:t>11/6/19</a:t>
             </a:fld>
             <a:endParaRPr lang="en-US" dirty="0"/>
           </a:p>
@@ -2259,7 +2259,7 @@
             <a:fld id="{B61BEF0D-F0BB-DE4B-95CE-6DB70DBA9567}" type="datetimeFigureOut">
               <a:rPr lang="en-US"/>
               <a:pPr/>
-              <a:t>10/7/19</a:t>
+              <a:t>11/6/19</a:t>
             </a:fld>
             <a:endParaRPr lang="en-US" dirty="0"/>
           </a:p>
@@ -2402,7 +2402,7 @@
             <a:fld id="{B61BEF0D-F0BB-DE4B-95CE-6DB70DBA9567}" type="datetimeFigureOut">
               <a:rPr lang="en-US"/>
               <a:pPr/>
-              <a:t>10/7/19</a:t>
+              <a:t>11/6/19</a:t>
             </a:fld>
             <a:endParaRPr lang="en-US" dirty="0"/>
           </a:p>
@@ -2529,7 +2529,7 @@
             <a:fld id="{B61BEF0D-F0BB-DE4B-95CE-6DB70DBA9567}" type="datetimeFigureOut">
               <a:rPr lang="en-US"/>
               <a:pPr/>
-              <a:t>10/7/19</a:t>
+              <a:t>11/6/19</a:t>
             </a:fld>
             <a:endParaRPr lang="en-US" dirty="0"/>
           </a:p>
@@ -2854,7 +2854,7 @@
             <a:fld id="{B61BEF0D-F0BB-DE4B-95CE-6DB70DBA9567}" type="datetimeFigureOut">
               <a:rPr lang="en-US"/>
               <a:pPr/>
-              <a:t>10/7/19</a:t>
+              <a:t>11/6/19</a:t>
             </a:fld>
             <a:endParaRPr lang="en-US" dirty="0"/>
           </a:p>
@@ -3057,7 +3057,7 @@
             </a:lvl9pPr>
           </a:lstStyle>
           <a:p>
-            <a:endParaRPr lang="en-US"/>
+            <a:endParaRPr lang="en-US" dirty="0"/>
           </a:p>
         </p:txBody>
       </p:sp>
@@ -3156,7 +3156,7 @@
             <a:fld id="{B61BEF0D-F0BB-DE4B-95CE-6DB70DBA9567}" type="datetimeFigureOut">
               <a:rPr lang="en-US"/>
               <a:pPr/>
-              <a:t>10/7/19</a:t>
+              <a:t>11/6/19</a:t>
             </a:fld>
             <a:endParaRPr lang="en-US" dirty="0"/>
           </a:p>
@@ -3411,7 +3411,7 @@
             <a:fld id="{B61BEF0D-F0BB-DE4B-95CE-6DB70DBA9567}" type="datetimeFigureOut">
               <a:rPr lang="en-US"/>
               <a:pPr/>
-              <a:t>10/7/19</a:t>
+              <a:t>11/6/19</a:t>
             </a:fld>
             <a:endParaRPr lang="en-US" dirty="0"/>
           </a:p>
@@ -4060,16 +4060,16 @@
           <a:p>
             <a:pPr algn="ctr"/>
             <a:r>
-              <a:rPr lang="en-US"/>
+              <a:rPr lang="en-US" dirty="0"/>
               <a:t>This presentation and source code is available at: </a:t>
             </a:r>
             <a:r>
-              <a:rPr lang="en-US">
+              <a:rPr lang="en-US" dirty="0">
                 <a:hlinkClick r:id="rId3"/>
               </a:rPr>
               <a:t>https://github.com/evarga/parallel-computing-lectures.git</a:t>
             </a:r>
-            <a:endParaRPr lang="en-US"/>
+            <a:endParaRPr lang="en-US" dirty="0"/>
           </a:p>
         </p:txBody>
       </p:sp>
@@ -4205,7 +4205,7 @@
           <a:lstStyle/>
           <a:p>
             <a:pPr algn="ctr"/>
-            <a:endParaRPr lang="en-US"/>
+            <a:endParaRPr lang="en-US" dirty="0"/>
           </a:p>
         </p:txBody>
       </p:sp>
@@ -4283,7 +4283,7 @@
           <a:lstStyle/>
           <a:p>
             <a:r>
-              <a:rPr lang="en-US">
+              <a:rPr lang="en-US" dirty="0">
                 <a:solidFill>
                   <a:srgbClr val="000000"/>
                 </a:solidFill>
@@ -4463,7 +4463,7 @@
           <a:lstStyle/>
           <a:p>
             <a:pPr algn="ctr"/>
-            <a:endParaRPr lang="en-US"/>
+            <a:endParaRPr lang="en-US" dirty="0"/>
           </a:p>
         </p:txBody>
       </p:sp>
@@ -4535,7 +4535,7 @@
           <a:lstStyle/>
           <a:p>
             <a:r>
-              <a:rPr lang="en-US" sz="2000">
+              <a:rPr lang="en-US" sz="2000" dirty="0">
                 <a:solidFill>
                   <a:srgbClr val="000000"/>
                 </a:solidFill>
@@ -4545,7 +4545,7 @@
           </a:p>
           <a:p>
             <a:r>
-              <a:rPr lang="en-US" sz="2000">
+              <a:rPr lang="en-US" sz="2000" dirty="0">
                 <a:solidFill>
                   <a:srgbClr val="000000"/>
                 </a:solidFill>
@@ -4555,7 +4555,7 @@
           </a:p>
           <a:p>
             <a:r>
-              <a:rPr lang="en-US" sz="2000">
+              <a:rPr lang="en-US" sz="2000" dirty="0">
                 <a:solidFill>
                   <a:srgbClr val="000000"/>
                 </a:solidFill>
@@ -4565,7 +4565,7 @@
           </a:p>
           <a:p>
             <a:r>
-              <a:rPr lang="en-US" sz="2000">
+              <a:rPr lang="en-US" sz="2000" dirty="0">
                 <a:solidFill>
                   <a:srgbClr val="000000"/>
                 </a:solidFill>
@@ -4575,7 +4575,7 @@
           </a:p>
           <a:p>
             <a:r>
-              <a:rPr lang="en-US" sz="2000">
+              <a:rPr lang="en-US" sz="2000" dirty="0">
                 <a:solidFill>
                   <a:srgbClr val="000000"/>
                 </a:solidFill>
@@ -4585,7 +4585,7 @@
           </a:p>
           <a:p>
             <a:r>
-              <a:rPr lang="en-US" sz="2000">
+              <a:rPr lang="en-US" sz="2000" dirty="0">
                 <a:solidFill>
                   <a:srgbClr val="000000"/>
                 </a:solidFill>
@@ -5720,7 +5720,7 @@
           <a:lstStyle/>
           <a:p>
             <a:pPr algn="ctr"/>
-            <a:endParaRPr lang="en-US"/>
+            <a:endParaRPr lang="en-US" dirty="0"/>
           </a:p>
         </p:txBody>
       </p:sp>
@@ -5799,7 +5799,7 @@
           <a:p>
             <a:pPr algn="ctr"/>
             <a:r>
-              <a:rPr lang="en-US" sz="4000">
+              <a:rPr lang="en-US" sz="4000" dirty="0">
                 <a:solidFill>
                   <a:srgbClr val="FFFFFF"/>
                 </a:solidFill>
@@ -5838,7 +5838,7 @@
           <a:lstStyle/>
           <a:p>
             <a:r>
-              <a:rPr lang="en-US" sz="2000">
+              <a:rPr lang="en-US" sz="2000" dirty="0">
                 <a:solidFill>
                   <a:srgbClr val="000000"/>
                 </a:solidFill>
@@ -5848,7 +5848,7 @@
           </a:p>
           <a:p>
             <a:r>
-              <a:rPr lang="en-US" sz="2000">
+              <a:rPr lang="en-US" sz="2000" dirty="0">
                 <a:solidFill>
                   <a:srgbClr val="000000"/>
                 </a:solidFill>
@@ -5858,17 +5858,17 @@
           </a:p>
           <a:p>
             <a:r>
-              <a:rPr lang="en-US" sz="2000">
+              <a:rPr lang="en-US" sz="2000" dirty="0">
                 <a:solidFill>
                   <a:srgbClr val="000000"/>
                 </a:solidFill>
               </a:rPr>
-              <a:t>Version 3 - race condition reestablished by introducing a new blocking command</a:t>
-            </a:r>
-          </a:p>
-          <a:p>
-            <a:r>
-              <a:rPr lang="en-US" sz="2000">
+              <a:t>Version 3 - Race condition reestablished by introducing a new blocking command</a:t>
+            </a:r>
+          </a:p>
+          <a:p>
+            <a:r>
+              <a:rPr lang="en-US" sz="2000" dirty="0">
                 <a:solidFill>
                   <a:srgbClr val="000000"/>
                 </a:solidFill>
@@ -7114,7 +7114,7 @@
           <a:lstStyle/>
           <a:p>
             <a:pPr algn="ctr"/>
-            <a:endParaRPr lang="en-US"/>
+            <a:endParaRPr lang="en-US" dirty="0"/>
           </a:p>
         </p:txBody>
       </p:sp>
@@ -7199,7 +7199,7 @@
           <a:lstStyle/>
           <a:p>
             <a:pPr algn="ctr"/>
-            <a:endParaRPr lang="en-US"/>
+            <a:endParaRPr lang="en-US" dirty="0"/>
           </a:p>
         </p:txBody>
       </p:sp>
@@ -7277,7 +7277,7 @@
           <a:lstStyle/>
           <a:p>
             <a:r>
-              <a:rPr lang="en-US">
+              <a:rPr lang="en-US" dirty="0">
                 <a:solidFill>
                   <a:srgbClr val="FFFFFF"/>
                 </a:solidFill>
@@ -7316,7 +7316,7 @@
           <a:lstStyle/>
           <a:p>
             <a:r>
-              <a:rPr lang="en-US" sz="2400">
+              <a:rPr lang="en-US" sz="2400" dirty="0">
                 <a:solidFill>
                   <a:srgbClr val="000000"/>
                 </a:solidFill>
@@ -7326,7 +7326,7 @@
           </a:p>
           <a:p>
             <a:r>
-              <a:rPr lang="en-US" sz="2400">
+              <a:rPr lang="en-US" sz="2400" dirty="0">
                 <a:solidFill>
                   <a:srgbClr val="000000"/>
                 </a:solidFill>
@@ -7336,12 +7336,12 @@
           </a:p>
           <a:p>
             <a:r>
-              <a:rPr lang="en-US" sz="2400">
+              <a:rPr lang="en-US" sz="2400" dirty="0">
                 <a:solidFill>
                   <a:srgbClr val="000000"/>
                 </a:solidFill>
               </a:rPr>
-              <a:t>You have witnessed what parallelism, concurrency, race condition, shared variables, inter-process communication, and blocking mean.</a:t>
+              <a:t>You have witnessed what parallelism, concurrency control, race condition, shared variables, inter-process communication, and blocking mean.</a:t>
             </a:r>
           </a:p>
         </p:txBody>

</xml_diff>